<commit_message>
update PowerPoint and pdf docs
</commit_message>
<xml_diff>
--- a/SSCC Post-estimation Parameter Re-centering and Rescaling.pptx
+++ b/SSCC Post-estimation Parameter Re-centering and Rescaling.pptx
@@ -285,7 +285,7 @@
           <a:p>
             <a:fld id="{FA5D2B6A-6C81-41A4-9E1F-D523B452CC3B}" type="datetimeFigureOut">
               <a:rPr lang="en-US" smtClean="0"/>
-              <a:t>7/28/2015</a:t>
+              <a:t>8/5/2015</a:t>
             </a:fld>
             <a:endParaRPr lang="en-US"/>
           </a:p>
@@ -450,7 +450,7 @@
           <a:p>
             <a:fld id="{EA8773C4-154D-4811-AF1F-A887ABE4B557}" type="datetimeFigureOut">
               <a:rPr lang="en-US" smtClean="0"/>
-              <a:t>7/28/2015</a:t>
+              <a:t>8/5/2015</a:t>
             </a:fld>
             <a:endParaRPr lang="en-US"/>
           </a:p>
@@ -1936,95 +1936,34 @@
             </a:r>
             <a:r>
               <a:rPr lang="en-US" dirty="0" smtClean="0"/>
-              <a:t> and rescaling parameters a </a:t>
-            </a:r>
+              <a:t> and rescaling parameters a couple of years ago, when one of our post-docs came to me with a simulation she wanted help with.  </a:t>
+            </a:r>
+          </a:p>
+          <a:p>
+            <a:endParaRPr lang="en-US" dirty="0"/>
+          </a:p>
+          <a:p>
             <a:r>
               <a:rPr lang="en-US" dirty="0" smtClean="0"/>
-              <a:t>couple of years ago, </a:t>
-            </a:r>
+              <a:t>She was writing for a Psychology journal that required all results to include standardized coefficients, so she needed to simulate both her original model and the standardized one.</a:t>
+            </a:r>
+          </a:p>
+          <a:p>
+            <a:endParaRPr lang="en-US" dirty="0"/>
+          </a:p>
+          <a:p>
             <a:r>
               <a:rPr lang="en-US" dirty="0" smtClean="0"/>
-              <a:t>when one </a:t>
-            </a:r>
+              <a:t>She had her original model, and the descriptive statistics, but she had changed Universities and no longer had access to the data.</a:t>
+            </a:r>
+          </a:p>
+          <a:p>
+            <a:endParaRPr lang="en-US" dirty="0"/>
+          </a:p>
+          <a:p>
             <a:r>
               <a:rPr lang="en-US" dirty="0" smtClean="0"/>
-              <a:t>of our post-docs came to me with a simulation she wanted help with.  </a:t>
-            </a:r>
-            <a:endParaRPr lang="en-US" dirty="0" smtClean="0"/>
-          </a:p>
-          <a:p>
-            <a:endParaRPr lang="en-US" dirty="0"/>
-          </a:p>
-          <a:p>
-            <a:r>
-              <a:rPr lang="en-US" dirty="0" smtClean="0"/>
-              <a:t>She </a:t>
-            </a:r>
-            <a:r>
-              <a:rPr lang="en-US" dirty="0" smtClean="0"/>
-              <a:t>was writing for a Psychology journal that required all results </a:t>
-            </a:r>
-            <a:r>
-              <a:rPr lang="en-US" dirty="0" smtClean="0"/>
-              <a:t>to include </a:t>
-            </a:r>
-            <a:r>
-              <a:rPr lang="en-US" dirty="0" smtClean="0"/>
-              <a:t>standardized coefficients, so she needed to simulate both her original model and the standardized one.</a:t>
-            </a:r>
-          </a:p>
-          <a:p>
-            <a:endParaRPr lang="en-US" dirty="0"/>
-          </a:p>
-          <a:p>
-            <a:r>
-              <a:rPr lang="en-US" dirty="0" smtClean="0"/>
-              <a:t>She had her </a:t>
-            </a:r>
-            <a:r>
-              <a:rPr lang="en-US" dirty="0" smtClean="0"/>
-              <a:t>original model</a:t>
-            </a:r>
-            <a:r>
-              <a:rPr lang="en-US" dirty="0" smtClean="0"/>
-              <a:t>, and the descriptive statistics, but she had changed </a:t>
-            </a:r>
-            <a:r>
-              <a:rPr lang="en-US" dirty="0" smtClean="0"/>
-              <a:t>Universities </a:t>
-            </a:r>
-            <a:r>
-              <a:rPr lang="en-US" dirty="0" smtClean="0"/>
-              <a:t>and no longer had access to the data.</a:t>
-            </a:r>
-          </a:p>
-          <a:p>
-            <a:endParaRPr lang="en-US" dirty="0"/>
-          </a:p>
-          <a:p>
-            <a:r>
-              <a:rPr lang="en-US" dirty="0" smtClean="0"/>
-              <a:t>A </a:t>
-            </a:r>
-            <a:r>
-              <a:rPr lang="en-US" dirty="0" smtClean="0"/>
-              <a:t>main </a:t>
-            </a:r>
-            <a:r>
-              <a:rPr lang="en-US" dirty="0" smtClean="0"/>
-              <a:t>point of her model was </a:t>
-            </a:r>
-            <a:r>
-              <a:rPr lang="en-US" dirty="0" smtClean="0"/>
-              <a:t>it’s </a:t>
-            </a:r>
-            <a:r>
-              <a:rPr lang="en-US" dirty="0" smtClean="0"/>
-              <a:t>interaction term</a:t>
-            </a:r>
-            <a:r>
-              <a:rPr lang="en-US" dirty="0" smtClean="0"/>
-              <a:t>.</a:t>
+              <a:t>A main point of her model was it’s interaction term.</a:t>
             </a:r>
           </a:p>
           <a:p>
@@ -2624,8 +2563,8 @@
         </p:nvSpPr>
         <p:spPr/>
       </p:sp>
-      <mc:AlternateContent xmlns:mc="http://schemas.openxmlformats.org/markup-compatibility/2006">
-        <mc:Choice xmlns:a14="http://schemas.microsoft.com/office/drawing/2010/main" Requires="a14">
+      <mc:AlternateContent xmlns:mc="http://schemas.openxmlformats.org/markup-compatibility/2006" xmlns:a14="http://schemas.microsoft.com/office/drawing/2010/main">
+        <mc:Choice Requires="a14">
           <p:sp>
             <p:nvSpPr>
               <p:cNvPr id="3" name="Notes Placeholder 2"/>
@@ -2739,7 +2678,7 @@
             </p:txBody>
           </p:sp>
         </mc:Choice>
-        <mc:Fallback>
+        <mc:Fallback xmlns="">
           <p:sp>
             <p:nvSpPr>
               <p:cNvPr id="3" name="Notes Placeholder 2"/>
@@ -4268,31 +4207,7 @@
           <a:p>
             <a:r>
               <a:rPr lang="en-US" dirty="0" smtClean="0"/>
-              <a:t>Looking at a graph like this one, it is fairly intuitive that the relationships among the data points, and with the fitted line have not changed, </a:t>
-            </a:r>
-            <a:r>
-              <a:rPr lang="en-US" dirty="0" smtClean="0"/>
-              <a:t>but we </a:t>
-            </a:r>
-            <a:r>
-              <a:rPr lang="en-US" dirty="0" smtClean="0"/>
-              <a:t>have </a:t>
-            </a:r>
-            <a:r>
-              <a:rPr lang="en-US" dirty="0" smtClean="0"/>
-              <a:t>changed </a:t>
-            </a:r>
-            <a:r>
-              <a:rPr lang="en-US" dirty="0" smtClean="0"/>
-              <a:t>how </a:t>
-            </a:r>
-            <a:r>
-              <a:rPr lang="en-US" dirty="0" smtClean="0"/>
-              <a:t>the axis is </a:t>
-            </a:r>
-            <a:r>
-              <a:rPr lang="en-US" dirty="0" smtClean="0"/>
-              <a:t>labeled.</a:t>
+              <a:t>Looking at a graph like this one, it is fairly intuitive that the relationships among the data points, and with the fitted line have not changed, but we have changed how the axis is labeled.</a:t>
             </a:r>
           </a:p>
           <a:p>
@@ -4310,15 +4225,7 @@
           <a:p>
             <a:r>
               <a:rPr lang="en-US" dirty="0" smtClean="0"/>
-              <a:t>A change of basis in the data induces a </a:t>
-            </a:r>
-            <a:r>
-              <a:rPr lang="en-US" dirty="0" smtClean="0"/>
-              <a:t>natural and intuitive </a:t>
-            </a:r>
-            <a:r>
-              <a:rPr lang="en-US" dirty="0" smtClean="0"/>
-              <a:t>change of basis for the parameters as well.  So there is a linear transformation that takes our parameters, expressed in the original terms, and converts them to the new basis.</a:t>
+              <a:t>A change of basis in the data induces a natural and intuitive change of basis for the parameters as well.  So there is a linear transformation that takes our parameters, expressed in the original terms, and converts them to the new basis.</a:t>
             </a:r>
           </a:p>
           <a:p>
@@ -4781,36 +4688,16 @@
           <a:p>
             <a:r>
               <a:rPr lang="en-US" dirty="0" smtClean="0"/>
-              <a:t>I want to </a:t>
-            </a:r>
+              <a:t>I want to outline the math first, and then sketch the Stata programming.</a:t>
+            </a:r>
+          </a:p>
+          <a:p>
+            <a:endParaRPr lang="en-US" dirty="0"/>
+          </a:p>
+          <a:p>
             <a:r>
               <a:rPr lang="en-US" dirty="0" smtClean="0"/>
-              <a:t>outline the </a:t>
-            </a:r>
-            <a:r>
-              <a:rPr lang="en-US" dirty="0" smtClean="0"/>
-              <a:t>math first, and </a:t>
-            </a:r>
-            <a:r>
-              <a:rPr lang="en-US" dirty="0" smtClean="0"/>
-              <a:t>then sketch </a:t>
-            </a:r>
-            <a:r>
-              <a:rPr lang="en-US" dirty="0" smtClean="0"/>
-              <a:t>the Stata programming.</a:t>
-            </a:r>
-          </a:p>
-          <a:p>
-            <a:endParaRPr lang="en-US" dirty="0"/>
-          </a:p>
-          <a:p>
-            <a:r>
-              <a:rPr lang="en-US" dirty="0" smtClean="0"/>
-              <a:t>And this will be a hand-waving overview</a:t>
-            </a:r>
-            <a:r>
-              <a:rPr lang="en-US" dirty="0" smtClean="0"/>
-              <a:t>.</a:t>
+              <a:t>And this will be a hand-waving overview.</a:t>
             </a:r>
           </a:p>
           <a:p>
@@ -4999,11 +4886,7 @@
           <a:p>
             <a:r>
               <a:rPr lang="en-US" dirty="0" smtClean="0"/>
-              <a:t>The change to the precision matrix is equally simple</a:t>
-            </a:r>
-            <a:r>
-              <a:rPr lang="en-US" dirty="0" smtClean="0"/>
-              <a:t>.</a:t>
+              <a:t>The change to the precision matrix is equally simple.</a:t>
             </a:r>
           </a:p>
           <a:p>
@@ -5467,7 +5350,7 @@
               <a:pPr>
                 <a:defRPr/>
               </a:pPr>
-              <a:t>7/28/2015</a:t>
+              <a:t>8/5/2015</a:t>
             </a:fld>
             <a:endParaRPr lang="en-US"/>
           </a:p>
@@ -5664,7 +5547,7 @@
               <a:pPr>
                 <a:defRPr/>
               </a:pPr>
-              <a:t>7/28/2015</a:t>
+              <a:t>8/5/2015</a:t>
             </a:fld>
             <a:endParaRPr lang="en-US" dirty="0"/>
           </a:p>
@@ -5870,7 +5753,7 @@
               <a:pPr>
                 <a:defRPr/>
               </a:pPr>
-              <a:t>7/28/2015</a:t>
+              <a:t>8/5/2015</a:t>
             </a:fld>
             <a:endParaRPr lang="en-US" dirty="0"/>
           </a:p>
@@ -6066,7 +5949,7 @@
               <a:pPr>
                 <a:defRPr/>
               </a:pPr>
-              <a:t>7/28/2015</a:t>
+              <a:t>8/5/2015</a:t>
             </a:fld>
             <a:endParaRPr lang="en-US" dirty="0"/>
           </a:p>
@@ -6579,7 +6462,7 @@
               <a:pPr>
                 <a:defRPr/>
               </a:pPr>
-              <a:t>7/28/2015</a:t>
+              <a:t>8/5/2015</a:t>
             </a:fld>
             <a:endParaRPr lang="en-US"/>
           </a:p>
@@ -6875,7 +6758,7 @@
               <a:pPr>
                 <a:defRPr/>
               </a:pPr>
-              <a:t>7/28/2015</a:t>
+              <a:t>8/5/2015</a:t>
             </a:fld>
             <a:endParaRPr lang="en-US" dirty="0"/>
           </a:p>
@@ -7385,7 +7268,7 @@
               <a:pPr>
                 <a:defRPr/>
               </a:pPr>
-              <a:t>7/28/2015</a:t>
+              <a:t>8/5/2015</a:t>
             </a:fld>
             <a:endParaRPr lang="en-US" dirty="0"/>
           </a:p>
@@ -7532,7 +7415,7 @@
               <a:pPr>
                 <a:defRPr/>
               </a:pPr>
-              <a:t>7/28/2015</a:t>
+              <a:t>8/5/2015</a:t>
             </a:fld>
             <a:endParaRPr lang="en-US" dirty="0"/>
           </a:p>
@@ -7770,7 +7653,7 @@
               <a:pPr>
                 <a:defRPr/>
               </a:pPr>
-              <a:t>7/28/2015</a:t>
+              <a:t>8/5/2015</a:t>
             </a:fld>
             <a:endParaRPr lang="en-US"/>
           </a:p>
@@ -8058,7 +7941,7 @@
               <a:pPr>
                 <a:defRPr/>
               </a:pPr>
-              <a:t>7/28/2015</a:t>
+              <a:t>8/5/2015</a:t>
             </a:fld>
             <a:endParaRPr lang="en-US" dirty="0"/>
           </a:p>
@@ -8533,7 +8416,7 @@
               <a:pPr>
                 <a:defRPr/>
               </a:pPr>
-              <a:t>7/28/2015</a:t>
+              <a:t>8/5/2015</a:t>
             </a:fld>
             <a:endParaRPr lang="en-US"/>
           </a:p>
@@ -8929,7 +8812,7 @@
               <a:pPr>
                 <a:defRPr/>
               </a:pPr>
-              <a:t>7/28/2015</a:t>
+              <a:t>8/5/2015</a:t>
             </a:fld>
             <a:endParaRPr lang="en-US" dirty="0"/>
           </a:p>
@@ -10311,8 +10194,8 @@
           </a:p>
         </p:txBody>
       </p:sp>
-      <mc:AlternateContent xmlns:mc="http://schemas.openxmlformats.org/markup-compatibility/2006">
-        <mc:Choice xmlns:a14="http://schemas.microsoft.com/office/drawing/2010/main" Requires="a14">
+      <mc:AlternateContent xmlns:mc="http://schemas.openxmlformats.org/markup-compatibility/2006" xmlns:a14="http://schemas.microsoft.com/office/drawing/2010/main">
+        <mc:Choice Requires="a14">
           <p:sp>
             <p:nvSpPr>
               <p:cNvPr id="3" name="Content Placeholder 2"/>
@@ -10636,16 +10519,7 @@
                           <a:rPr lang="en-US" sz="2000" b="0" i="0" smtClean="0">
                             <a:latin typeface="Cambria Math" panose="02040503050406030204" pitchFamily="18" charset="0"/>
                           </a:rPr>
-                          <m:t>z</m:t>
-                        </m:r>
-                        <m:r>
-                          <m:rPr>
-                            <m:sty m:val="p"/>
-                          </m:rPr>
-                          <a:rPr lang="en-US" sz="2000" b="0" i="0" smtClean="0">
-                            <a:latin typeface="Cambria Math" panose="02040503050406030204" pitchFamily="18" charset="0"/>
-                          </a:rPr>
-                          <m:t>y</m:t>
+                          <m:t>zy</m:t>
                         </m:r>
                       </m:sup>
                     </m:sSubSup>
@@ -10733,13 +10607,7 @@
                           <a:rPr lang="en-US" sz="2000" b="0" i="1" smtClean="0">
                             <a:latin typeface="Cambria Math" panose="02040503050406030204" pitchFamily="18" charset="0"/>
                           </a:rPr>
-                          <m:t>𝑧</m:t>
-                        </m:r>
-                        <m:r>
-                          <a:rPr lang="en-US" sz="2000" b="0" i="1" smtClean="0">
-                            <a:latin typeface="Cambria Math" panose="02040503050406030204" pitchFamily="18" charset="0"/>
-                          </a:rPr>
-                          <m:t>𝑦</m:t>
+                          <m:t>𝑧𝑦</m:t>
                         </m:r>
                       </m:sup>
                     </m:sSup>
@@ -10898,7 +10766,7 @@
             </p:txBody>
           </p:sp>
         </mc:Choice>
-        <mc:Fallback>
+        <mc:Fallback xmlns="">
           <p:sp>
             <p:nvSpPr>
               <p:cNvPr id="3" name="Content Placeholder 2"/>
@@ -12969,8 +12837,8 @@
           </a:p>
         </p:txBody>
       </p:sp>
-      <mc:AlternateContent xmlns:mc="http://schemas.openxmlformats.org/markup-compatibility/2006">
-        <mc:Choice xmlns:a14="http://schemas.microsoft.com/office/drawing/2010/main" Requires="a14">
+      <mc:AlternateContent xmlns:mc="http://schemas.openxmlformats.org/markup-compatibility/2006" xmlns:a14="http://schemas.microsoft.com/office/drawing/2010/main">
+        <mc:Choice Requires="a14">
           <p:sp>
             <p:nvSpPr>
               <p:cNvPr id="3" name="Content Placeholder 2"/>
@@ -14648,7 +14516,7 @@
             </p:txBody>
           </p:sp>
         </mc:Choice>
-        <mc:Fallback>
+        <mc:Fallback xmlns="">
           <p:sp>
             <p:nvSpPr>
               <p:cNvPr id="3" name="Content Placeholder 2"/>
@@ -14802,8 +14670,8 @@
           </a:p>
         </p:txBody>
       </p:sp>
-      <mc:AlternateContent xmlns:mc="http://schemas.openxmlformats.org/markup-compatibility/2006">
-        <mc:Choice xmlns:a14="http://schemas.microsoft.com/office/drawing/2010/main" Requires="a14">
+      <mc:AlternateContent xmlns:mc="http://schemas.openxmlformats.org/markup-compatibility/2006" xmlns:a14="http://schemas.microsoft.com/office/drawing/2010/main">
+        <mc:Choice Requires="a14">
           <p:sp>
             <p:nvSpPr>
               <p:cNvPr id="3" name="Content Placeholder 2"/>
@@ -16341,7 +16209,7 @@
             </p:txBody>
           </p:sp>
         </mc:Choice>
-        <mc:Fallback>
+        <mc:Fallback xmlns="">
           <p:sp>
             <p:nvSpPr>
               <p:cNvPr id="3" name="Content Placeholder 2"/>
@@ -30583,8 +30451,8 @@
           </a:p>
         </p:txBody>
       </p:sp>
-      <mc:AlternateContent xmlns:mc="http://schemas.openxmlformats.org/markup-compatibility/2006">
-        <mc:Choice xmlns:a14="http://schemas.microsoft.com/office/drawing/2010/main" Requires="a14">
+      <mc:AlternateContent xmlns:mc="http://schemas.openxmlformats.org/markup-compatibility/2006" xmlns:a14="http://schemas.microsoft.com/office/drawing/2010/main">
+        <mc:Choice Requires="a14">
           <p:sp>
             <p:nvSpPr>
               <p:cNvPr id="3" name="Content Placeholder 2"/>
@@ -30925,7 +30793,7 @@
             </p:txBody>
           </p:sp>
         </mc:Choice>
-        <mc:Fallback>
+        <mc:Fallback xmlns="">
           <p:sp>
             <p:nvSpPr>
               <p:cNvPr id="3" name="Content Placeholder 2"/>
@@ -31012,8 +30880,8 @@
           </a:p>
         </p:txBody>
       </p:sp>
-      <mc:AlternateContent xmlns:mc="http://schemas.openxmlformats.org/markup-compatibility/2006">
-        <mc:Choice xmlns:a14="http://schemas.microsoft.com/office/drawing/2010/main" Requires="a14">
+      <mc:AlternateContent xmlns:mc="http://schemas.openxmlformats.org/markup-compatibility/2006" xmlns:a14="http://schemas.microsoft.com/office/drawing/2010/main">
+        <mc:Choice Requires="a14">
           <p:sp>
             <p:nvSpPr>
               <p:cNvPr id="3" name="Content Placeholder 2"/>
@@ -31827,14 +31695,7 @@
                                         <a:latin typeface="Cambria Math" panose="02040503050406030204" pitchFamily="18" charset="0"/>
                                         <a:ea typeface="Cambria Math" panose="02040503050406030204" pitchFamily="18" charset="0"/>
                                       </a:rPr>
-                                      <m:t>1</m:t>
-                                    </m:r>
-                                    <m:r>
-                                      <a:rPr lang="en-US" sz="2000" b="0" i="1" smtClean="0">
-                                        <a:latin typeface="Cambria Math" panose="02040503050406030204" pitchFamily="18" charset="0"/>
-                                        <a:ea typeface="Cambria Math" panose="02040503050406030204" pitchFamily="18" charset="0"/>
-                                      </a:rPr>
-                                      <m:t>2</m:t>
+                                      <m:t>12</m:t>
                                     </m:r>
                                   </m:sub>
                                   <m:sup>
@@ -32361,14 +32222,7 @@
                                         <a:latin typeface="Cambria Math" panose="02040503050406030204" pitchFamily="18" charset="0"/>
                                         <a:ea typeface="Cambria Math" panose="02040503050406030204" pitchFamily="18" charset="0"/>
                                       </a:rPr>
-                                      <m:t>1</m:t>
-                                    </m:r>
-                                    <m:r>
-                                      <a:rPr lang="en-US" sz="2000" b="0" i="1" smtClean="0">
-                                        <a:latin typeface="Cambria Math" panose="02040503050406030204" pitchFamily="18" charset="0"/>
-                                        <a:ea typeface="Cambria Math" panose="02040503050406030204" pitchFamily="18" charset="0"/>
-                                      </a:rPr>
-                                      <m:t>2</m:t>
+                                      <m:t>12</m:t>
                                     </m:r>
                                   </m:sub>
                                 </m:sSub>
@@ -32385,7 +32239,7 @@
             </p:txBody>
           </p:sp>
         </mc:Choice>
-        <mc:Fallback>
+        <mc:Fallback xmlns="">
           <p:sp>
             <p:nvSpPr>
               <p:cNvPr id="3" name="Content Placeholder 2"/>
@@ -32472,8 +32326,8 @@
           </a:p>
         </p:txBody>
       </p:sp>
-      <mc:AlternateContent xmlns:mc="http://schemas.openxmlformats.org/markup-compatibility/2006">
-        <mc:Choice xmlns:a14="http://schemas.microsoft.com/office/drawing/2010/main" Requires="a14">
+      <mc:AlternateContent xmlns:mc="http://schemas.openxmlformats.org/markup-compatibility/2006" xmlns:a14="http://schemas.microsoft.com/office/drawing/2010/main">
+        <mc:Choice Requires="a14">
           <p:sp>
             <p:nvSpPr>
               <p:cNvPr id="3" name="Content Placeholder 2"/>
@@ -33157,14 +33011,7 @@
                                         <a:latin typeface="Cambria Math" panose="02040503050406030204" pitchFamily="18" charset="0"/>
                                         <a:ea typeface="Cambria Math" panose="02040503050406030204" pitchFamily="18" charset="0"/>
                                       </a:rPr>
-                                      <m:t>1</m:t>
-                                    </m:r>
-                                    <m:r>
-                                      <a:rPr lang="en-US" sz="2000" b="0" i="1" smtClean="0">
-                                        <a:latin typeface="Cambria Math" panose="02040503050406030204" pitchFamily="18" charset="0"/>
-                                        <a:ea typeface="Cambria Math" panose="02040503050406030204" pitchFamily="18" charset="0"/>
-                                      </a:rPr>
-                                      <m:t>2</m:t>
+                                      <m:t>12</m:t>
                                     </m:r>
                                   </m:sub>
                                 </m:sSub>
@@ -34218,7 +34065,7 @@
             </p:txBody>
           </p:sp>
         </mc:Choice>
-        <mc:Fallback>
+        <mc:Fallback xmlns="">
           <p:sp>
             <p:nvSpPr>
               <p:cNvPr id="3" name="Content Placeholder 2"/>
@@ -34486,11 +34333,7 @@
             <a:pPr lvl="1"/>
             <a:r>
               <a:rPr lang="en-US" sz="1800" dirty="0" smtClean="0"/>
-              <a:t>Identify </a:t>
-            </a:r>
-            <a:r>
-              <a:rPr lang="en-US" sz="1800" dirty="0" smtClean="0"/>
-              <a:t>variables, variable types, variables’ polynomial degree </a:t>
+              <a:t>Identify variables, variable types, variables’ polynomial degree </a:t>
             </a:r>
             <a:r>
               <a:rPr lang="en-US" sz="1800" dirty="0"/>
@@ -34559,15 +34402,7 @@
             </a:r>
             <a:r>
               <a:rPr lang="en-US" sz="1800" dirty="0" smtClean="0"/>
-              <a:t> </a:t>
-            </a:r>
-            <a:r>
-              <a:rPr lang="en-US" sz="1800" dirty="0" smtClean="0"/>
-              <a:t>matrix operator</a:t>
-            </a:r>
-            <a:r>
-              <a:rPr lang="en-US" sz="1800" dirty="0" smtClean="0"/>
-              <a:t>, </a:t>
+              <a:t> matrix operator, </a:t>
             </a:r>
             <a:r>
               <a:rPr lang="en-US" sz="1800" b="1" dirty="0" smtClean="0">
@@ -39574,7 +39409,28 @@
                 <a:latin typeface="Courier New" panose="02070309020205020404" pitchFamily="49" charset="0"/>
                 <a:cs typeface="Courier New" panose="02070309020205020404" pitchFamily="49" charset="0"/>
               </a:rPr>
-              <a:t>net from www.ssc.wisc.edu/~hemken/Stataworkshops</a:t>
+              <a:t>net </a:t>
+            </a:r>
+            <a:r>
+              <a:rPr lang="en-US" sz="1800" b="1">
+                <a:latin typeface="Courier New" panose="02070309020205020404" pitchFamily="49" charset="0"/>
+                <a:cs typeface="Courier New" panose="02070309020205020404" pitchFamily="49" charset="0"/>
+              </a:rPr>
+              <a:t>from </a:t>
+            </a:r>
+            <a:r>
+              <a:rPr lang="en-US" sz="1800" b="1" smtClean="0">
+                <a:latin typeface="Courier New" panose="02070309020205020404" pitchFamily="49" charset="0"/>
+                <a:cs typeface="Courier New" panose="02070309020205020404" pitchFamily="49" charset="0"/>
+              </a:rPr>
+              <a:t>http://www.ssc.wisc.edu</a:t>
+            </a:r>
+            <a:r>
+              <a:rPr lang="en-US" sz="1800" b="1" dirty="0">
+                <a:latin typeface="Courier New" panose="02070309020205020404" pitchFamily="49" charset="0"/>
+                <a:cs typeface="Courier New" panose="02070309020205020404" pitchFamily="49" charset="0"/>
+              </a:rPr>
+              <a:t>/~hemken/Stataworkshops</a:t>
             </a:r>
           </a:p>
           <a:p>
@@ -41328,8 +41184,8 @@
           </a:p>
         </p:txBody>
       </p:sp>
-      <mc:AlternateContent xmlns:mc="http://schemas.openxmlformats.org/markup-compatibility/2006">
-        <mc:Choice xmlns:a14="http://schemas.microsoft.com/office/drawing/2010/main" Requires="a14">
+      <mc:AlternateContent xmlns:mc="http://schemas.openxmlformats.org/markup-compatibility/2006" xmlns:a14="http://schemas.microsoft.com/office/drawing/2010/main">
+        <mc:Choice Requires="a14">
           <p:sp>
             <p:nvSpPr>
               <p:cNvPr id="3" name="Content Placeholder 2"/>
@@ -41653,16 +41509,7 @@
                           <a:rPr lang="en-US" sz="2000" b="0" i="0" smtClean="0">
                             <a:latin typeface="Cambria Math" panose="02040503050406030204" pitchFamily="18" charset="0"/>
                           </a:rPr>
-                          <m:t>Δ</m:t>
-                        </m:r>
-                        <m:r>
-                          <m:rPr>
-                            <m:sty m:val="p"/>
-                          </m:rPr>
-                          <a:rPr lang="en-US" sz="2000" b="0" i="0" smtClean="0">
-                            <a:latin typeface="Cambria Math" panose="02040503050406030204" pitchFamily="18" charset="0"/>
-                          </a:rPr>
-                          <m:t>y</m:t>
+                          <m:t>Δy</m:t>
                         </m:r>
                       </m:sup>
                     </m:sSubSup>
@@ -41765,16 +41612,7 @@
                           <a:rPr lang="en-US" sz="2000" b="0" i="0" smtClean="0">
                             <a:latin typeface="Cambria Math" panose="02040503050406030204" pitchFamily="18" charset="0"/>
                           </a:rPr>
-                          <m:t>Δ</m:t>
-                        </m:r>
-                        <m:r>
-                          <m:rPr>
-                            <m:sty m:val="p"/>
-                          </m:rPr>
-                          <a:rPr lang="en-US" sz="2000" b="0" i="0" smtClean="0">
-                            <a:latin typeface="Cambria Math" panose="02040503050406030204" pitchFamily="18" charset="0"/>
-                          </a:rPr>
-                          <m:t>y</m:t>
+                          <m:t>Δy</m:t>
                         </m:r>
                       </m:sup>
                     </m:sSup>
@@ -42019,7 +41857,7 @@
             </p:txBody>
           </p:sp>
         </mc:Choice>
-        <mc:Fallback>
+        <mc:Fallback xmlns="">
           <p:sp>
             <p:nvSpPr>
               <p:cNvPr id="3" name="Content Placeholder 2"/>

</xml_diff>